<commit_message>
SD toegevoegd aan presentatie
</commit_message>
<xml_diff>
--- a/SokobanPresentatie.pptx
+++ b/SokobanPresentatie.pptx
@@ -994,7 +994,7 @@
             <a:fld id="{CF62EBC8-870A-4832-A3B8-6310D7817D0D}" type="datetime1">
               <a:rPr lang="nl-NL" smtClean="0"/>
               <a:pPr algn="r" rtl="0"/>
-              <a:t>6-10-2018</a:t>
+              <a:t>7-10-2018</a:t>
             </a:fld>
             <a:endParaRPr lang="nl-NL" dirty="0"/>
           </a:p>
@@ -1164,7 +1164,7 @@
             <a:fld id="{C2C6F946-26EF-4139-A4CC-50BE60316263}" type="datetime1">
               <a:rPr lang="nl-NL" smtClean="0"/>
               <a:pPr/>
-              <a:t>6-10-2018</a:t>
+              <a:t>7-10-2018</a:t>
             </a:fld>
             <a:endParaRPr lang="nl-NL" dirty="0"/>
           </a:p>
@@ -3378,7 +3378,7 @@
             <a:fld id="{81533030-B54D-4E1D-9DF2-101E18EB0C25}" type="datetime1">
               <a:rPr lang="nl-NL" smtClean="0"/>
               <a:pPr/>
-              <a:t>6-10-2018</a:t>
+              <a:t>7-10-2018</a:t>
             </a:fld>
             <a:endParaRPr lang="nl-NL" dirty="0"/>
           </a:p>
@@ -3584,7 +3584,7 @@
             <a:fld id="{C402BEE1-B3B4-4AD9-9C4A-364FF0A0EAD7}" type="datetime1">
               <a:rPr lang="nl-NL" smtClean="0"/>
               <a:pPr/>
-              <a:t>6-10-2018</a:t>
+              <a:t>7-10-2018</a:t>
             </a:fld>
             <a:endParaRPr lang="nl-NL" dirty="0"/>
           </a:p>
@@ -3800,7 +3800,7 @@
             <a:fld id="{397458A3-3D63-4469-BA76-1CBC46D41863}" type="datetime1">
               <a:rPr lang="nl-NL" smtClean="0"/>
               <a:pPr/>
-              <a:t>6-10-2018</a:t>
+              <a:t>7-10-2018</a:t>
             </a:fld>
             <a:endParaRPr lang="nl-NL" dirty="0"/>
           </a:p>
@@ -4006,7 +4006,7 @@
             <a:fld id="{113F02B2-1431-4AD3-9831-8FA0B85B856B}" type="datetime1">
               <a:rPr lang="nl-NL" smtClean="0"/>
               <a:pPr/>
-              <a:t>6-10-2018</a:t>
+              <a:t>7-10-2018</a:t>
             </a:fld>
             <a:endParaRPr lang="nl-NL" dirty="0"/>
           </a:p>
@@ -4446,7 +4446,7 @@
             <a:fld id="{85346FBF-6E06-4668-8761-6C388A07E27A}" type="datetime1">
               <a:rPr lang="nl-NL" smtClean="0"/>
               <a:pPr/>
-              <a:t>6-10-2018</a:t>
+              <a:t>7-10-2018</a:t>
             </a:fld>
             <a:endParaRPr lang="nl-NL" dirty="0"/>
           </a:p>
@@ -4758,7 +4758,7 @@
             <a:fld id="{23312813-50D9-4C1C-A1EB-966B7EDA57A6}" type="datetime1">
               <a:rPr lang="nl-NL" smtClean="0"/>
               <a:pPr/>
-              <a:t>6-10-2018</a:t>
+              <a:t>7-10-2018</a:t>
             </a:fld>
             <a:endParaRPr lang="nl-NL" dirty="0"/>
           </a:p>
@@ -5222,7 +5222,7 @@
             <a:fld id="{F37F2428-0A3C-4053-826C-DB44A180E1D2}" type="datetime1">
               <a:rPr lang="nl-NL" smtClean="0"/>
               <a:pPr/>
-              <a:t>6-10-2018</a:t>
+              <a:t>7-10-2018</a:t>
             </a:fld>
             <a:endParaRPr lang="nl-NL" dirty="0"/>
           </a:p>
@@ -5360,7 +5360,7 @@
             <a:fld id="{05B74CA1-D974-43BD-9F5A-D3B3C41D8809}" type="datetime1">
               <a:rPr lang="nl-NL" smtClean="0"/>
               <a:pPr/>
-              <a:t>6-10-2018</a:t>
+              <a:t>7-10-2018</a:t>
             </a:fld>
             <a:endParaRPr lang="nl-NL" dirty="0"/>
           </a:p>
@@ -5474,7 +5474,7 @@
             <a:fld id="{AE16C345-0E0A-4756-8AB9-DB73A91B5F7C}" type="datetime1">
               <a:rPr lang="nl-NL" smtClean="0"/>
               <a:pPr/>
-              <a:t>6-10-2018</a:t>
+              <a:t>7-10-2018</a:t>
             </a:fld>
             <a:endParaRPr lang="nl-NL" dirty="0"/>
           </a:p>
@@ -5781,7 +5781,7 @@
             <a:fld id="{06782752-B68B-49C5-85CB-2680C737278B}" type="datetime1">
               <a:rPr lang="nl-NL" smtClean="0"/>
               <a:pPr/>
-              <a:t>6-10-2018</a:t>
+              <a:t>7-10-2018</a:t>
             </a:fld>
             <a:endParaRPr lang="nl-NL" dirty="0"/>
           </a:p>
@@ -6078,7 +6078,7 @@
             <a:fld id="{B8C3F3F2-508D-4C33-A172-A2C39F7A419D}" type="datetime1">
               <a:rPr lang="nl-NL" smtClean="0"/>
               <a:pPr/>
-              <a:t>6-10-2018</a:t>
+              <a:t>7-10-2018</a:t>
             </a:fld>
             <a:endParaRPr lang="nl-NL" dirty="0"/>
           </a:p>
@@ -6702,7 +6702,7 @@
             <a:fld id="{B9A15B82-ED5E-4D1F-93F8-A83EE8830D9D}" type="datetime1">
               <a:rPr lang="nl-NL" smtClean="0"/>
               <a:pPr/>
-              <a:t>6-10-2018</a:t>
+              <a:t>7-10-2018</a:t>
             </a:fld>
             <a:endParaRPr lang="nl-NL" dirty="0"/>
           </a:p>
@@ -7290,56 +7290,36 @@
           </a:p>
         </p:txBody>
       </p:sp>
-      <p:sp>
-        <p:nvSpPr>
-          <p:cNvPr id="3" name="Tijdelijke aanduiding voor inhoud 2">
+      <p:pic>
+        <p:nvPicPr>
+          <p:cNvPr id="5" name="Afbeelding 4">
             <a:extLst>
               <a:ext uri="{FF2B5EF4-FFF2-40B4-BE49-F238E27FC236}">
-                <a16:creationId xmlns:a16="http://schemas.microsoft.com/office/drawing/2014/main" id="{B9CF8023-7EE3-4FF8-8C8B-676D2C18EEEE}"/>
+                <a16:creationId xmlns:a16="http://schemas.microsoft.com/office/drawing/2014/main" id="{E5A60807-81FF-4CB2-A66F-14E4B7CC7FB3}"/>
               </a:ext>
             </a:extLst>
           </p:cNvPr>
-          <p:cNvSpPr>
-            <a:spLocks noGrp="1"/>
-          </p:cNvSpPr>
-          <p:nvPr>
-            <p:ph sz="half" idx="1"/>
-          </p:nvPr>
-        </p:nvSpPr>
-        <p:spPr/>
-        <p:txBody>
-          <a:bodyPr/>
-          <a:lstStyle/>
-          <a:p>
-            <a:endParaRPr lang="nl-NL"/>
-          </a:p>
-        </p:txBody>
-      </p:sp>
-      <p:sp>
-        <p:nvSpPr>
-          <p:cNvPr id="4" name="Tijdelijke aanduiding voor inhoud 3">
-            <a:extLst>
-              <a:ext uri="{FF2B5EF4-FFF2-40B4-BE49-F238E27FC236}">
-                <a16:creationId xmlns:a16="http://schemas.microsoft.com/office/drawing/2014/main" id="{2D86520C-72D4-4E3A-B886-E3EC93D90A0D}"/>
-              </a:ext>
-            </a:extLst>
-          </p:cNvPr>
-          <p:cNvSpPr>
-            <a:spLocks noGrp="1"/>
-          </p:cNvSpPr>
-          <p:nvPr>
-            <p:ph sz="half" idx="2"/>
-          </p:nvPr>
-        </p:nvSpPr>
-        <p:spPr/>
-        <p:txBody>
-          <a:bodyPr/>
-          <a:lstStyle/>
-          <a:p>
-            <a:endParaRPr lang="nl-NL"/>
-          </a:p>
-        </p:txBody>
-      </p:sp>
+          <p:cNvPicPr>
+            <a:picLocks noChangeAspect="1"/>
+          </p:cNvPicPr>
+          <p:nvPr/>
+        </p:nvPicPr>
+        <p:blipFill>
+          <a:blip r:embed="rId2"/>
+          <a:stretch>
+            <a:fillRect/>
+          </a:stretch>
+        </p:blipFill>
+        <p:spPr>
+          <a:xfrm>
+            <a:off x="4366220" y="55731"/>
+            <a:ext cx="7059010" cy="6677957"/>
+          </a:xfrm>
+          <a:prstGeom prst="rect">
+            <a:avLst/>
+          </a:prstGeom>
+        </p:spPr>
+      </p:pic>
     </p:spTree>
     <p:extLst>
       <p:ext uri="{BB962C8B-B14F-4D97-AF65-F5344CB8AC3E}">
@@ -10090,15 +10070,6 @@
 </file>
 
 <file path=customXml/item2.xml><?xml version="1.0" encoding="utf-8"?>
-<?mso-contentType ?>
-<FormTemplates xmlns="http://schemas.microsoft.com/sharepoint/v3/contenttype/forms">
-  <Display>DocumentLibraryForm</Display>
-  <Edit>AssetEditForm</Edit>
-  <New>DocumentLibraryForm</New>
-</FormTemplates>
-</file>
-
-<file path=customXml/item3.xml><?xml version="1.0" encoding="utf-8"?>
 <ct:contentTypeSchema xmlns:ct="http://schemas.microsoft.com/office/2006/metadata/contentType" xmlns:ma="http://schemas.microsoft.com/office/2006/metadata/properties/metaAttributes" ct:_="" ma:_="" ma:contentTypeName="TemplateFile" ma:contentTypeID="0x0101006EDDDB5EE6D98C44930B742096920B300400F5B6D36B3EF94B4E9A635CDF2A18F5B8" ma:contentTypeVersion="72" ma:contentTypeDescription="Create a new document." ma:contentTypeScope="" ma:versionID="a23e56308344d904b51738559c3d67c9">
   <xsd:schema xmlns:xsd="http://www.w3.org/2001/XMLSchema" xmlns:xs="http://www.w3.org/2001/XMLSchema" xmlns:p="http://schemas.microsoft.com/office/2006/metadata/properties" xmlns:ns2="4873beb7-5857-4685-be1f-d57550cc96cc" targetNamespace="http://schemas.microsoft.com/office/2006/metadata/properties" ma:root="true" ma:fieldsID="cd0908cc4600e77bf5da051303e00c8d" ns2:_="">
     <xsd:import namespace="4873beb7-5857-4685-be1f-d57550cc96cc"/>
@@ -11138,6 +11109,15 @@
 </ct:contentTypeSchema>
 </file>
 
+<file path=customXml/item3.xml><?xml version="1.0" encoding="utf-8"?>
+<?mso-contentType ?>
+<FormTemplates xmlns="http://schemas.microsoft.com/sharepoint/v3/contenttype/forms">
+  <Display>DocumentLibraryForm</Display>
+  <Edit>AssetEditForm</Edit>
+  <New>DocumentLibraryForm</New>
+</FormTemplates>
+</file>
+
 <file path=customXml/itemProps1.xml><?xml version="1.0" encoding="utf-8"?>
 <ds:datastoreItem xmlns:ds="http://schemas.openxmlformats.org/officeDocument/2006/customXml" ds:itemID="{60C67BEE-D13F-4BD2-98A5-34D8A0977F68}">
   <ds:schemaRefs>
@@ -11155,14 +11135,6 @@
 </file>
 
 <file path=customXml/itemProps2.xml><?xml version="1.0" encoding="utf-8"?>
-<ds:datastoreItem xmlns:ds="http://schemas.openxmlformats.org/officeDocument/2006/customXml" ds:itemID="{3836F65B-1B07-41EE-A0E8-BC6EF3855225}">
-  <ds:schemaRefs>
-    <ds:schemaRef ds:uri="http://schemas.microsoft.com/sharepoint/v3/contenttype/forms"/>
-  </ds:schemaRefs>
-</ds:datastoreItem>
-</file>
-
-<file path=customXml/itemProps3.xml><?xml version="1.0" encoding="utf-8"?>
 <ds:datastoreItem xmlns:ds="http://schemas.openxmlformats.org/officeDocument/2006/customXml" ds:itemID="{A09BF4D4-EF60-4196-BFC3-9462D607978C}">
   <ds:schemaRefs>
     <ds:schemaRef ds:uri="http://schemas.microsoft.com/office/2006/metadata/contentType"/>
@@ -11178,4 +11150,12 @@
     <ds:schemaRef ds:uri="http://schemas.microsoft.com/internal/obd"/>
   </ds:schemaRefs>
 </ds:datastoreItem>
+</file>
+
+<file path=customXml/itemProps3.xml><?xml version="1.0" encoding="utf-8"?>
+<ds:datastoreItem xmlns:ds="http://schemas.openxmlformats.org/officeDocument/2006/customXml" ds:itemID="{3836F65B-1B07-41EE-A0E8-BC6EF3855225}">
+  <ds:schemaRefs>
+    <ds:schemaRef ds:uri="http://schemas.microsoft.com/sharepoint/v3/contenttype/forms"/>
+  </ds:schemaRefs>
+</ds:datastoreItem>
 </file>
</xml_diff>

<commit_message>
SD's aangemaakt en toegevoegd aan de presentatie
</commit_message>
<xml_diff>
--- a/SokobanPresentatie.pptx
+++ b/SokobanPresentatie.pptx
@@ -221,7 +221,7 @@
                 <a:cs typeface="+mn-cs"/>
               </a:defRPr>
             </a:pPr>
-            <a:endParaRPr lang="nl-NL"/>
+            <a:endParaRPr lang="en-US"/>
           </a:p>
         </c:txPr>
         <c:crossAx val="632166128"/>
@@ -266,7 +266,7 @@
                 <a:cs typeface="+mn-cs"/>
               </a:defRPr>
             </a:pPr>
-            <a:endParaRPr lang="nl-NL"/>
+            <a:endParaRPr lang="en-US"/>
           </a:p>
         </c:txPr>
         <c:crossAx val="632163384"/>
@@ -308,7 +308,7 @@
               <a:cs typeface="+mn-cs"/>
             </a:defRPr>
           </a:pPr>
-          <a:endParaRPr lang="nl-NL"/>
+          <a:endParaRPr lang="en-US"/>
         </a:p>
       </c:txPr>
     </c:legend>
@@ -330,7 +330,7 @@
       <a:pPr>
         <a:defRPr/>
       </a:pPr>
-      <a:endParaRPr lang="nl-NL"/>
+      <a:endParaRPr lang="en-US"/>
     </a:p>
   </c:txPr>
   <c:externalData r:id="rId3">
@@ -2615,6 +2615,103 @@
 </p:notes>
 </file>
 
+<file path=ppt/notesSlides/notesSlide9.xml><?xml version="1.0" encoding="utf-8"?>
+<p:notes xmlns:a="http://schemas.openxmlformats.org/drawingml/2006/main" xmlns:r="http://schemas.openxmlformats.org/officeDocument/2006/relationships" xmlns:p="http://schemas.openxmlformats.org/presentationml/2006/main">
+  <p:cSld>
+    <p:spTree>
+      <p:nvGrpSpPr>
+        <p:cNvPr id="1" name=""/>
+        <p:cNvGrpSpPr/>
+        <p:nvPr/>
+      </p:nvGrpSpPr>
+      <p:grpSpPr>
+        <a:xfrm>
+          <a:off x="0" y="0"/>
+          <a:ext cx="0" cy="0"/>
+          <a:chOff x="0" y="0"/>
+          <a:chExt cx="0" cy="0"/>
+        </a:xfrm>
+      </p:grpSpPr>
+      <p:sp>
+        <p:nvSpPr>
+          <p:cNvPr id="2" name="Tijdelijke aanduiding voor dia-afbeelding 1"/>
+          <p:cNvSpPr>
+            <a:spLocks noGrp="1" noRot="1" noChangeAspect="1"/>
+          </p:cNvSpPr>
+          <p:nvPr>
+            <p:ph type="sldImg"/>
+          </p:nvPr>
+        </p:nvSpPr>
+        <p:spPr/>
+      </p:sp>
+      <p:sp>
+        <p:nvSpPr>
+          <p:cNvPr id="3" name="Tijdelijke aanduiding voor notities 2"/>
+          <p:cNvSpPr>
+            <a:spLocks noGrp="1"/>
+          </p:cNvSpPr>
+          <p:nvPr>
+            <p:ph type="body" idx="1"/>
+          </p:nvPr>
+        </p:nvSpPr>
+        <p:spPr/>
+        <p:txBody>
+          <a:bodyPr/>
+          <a:lstStyle/>
+          <a:p>
+            <a:r>
+              <a:rPr lang="nl-NL" dirty="0"/>
+              <a:t>De </a:t>
+            </a:r>
+            <a:r>
+              <a:rPr lang="nl-NL" dirty="0" err="1"/>
+              <a:t>SD’s</a:t>
+            </a:r>
+            <a:r>
+              <a:rPr lang="nl-NL" dirty="0"/>
+              <a:t> staat op aparte pagina’s omdat ze niet in een dia passen.</a:t>
+            </a:r>
+            <a:endParaRPr lang="en-US" dirty="0"/>
+          </a:p>
+        </p:txBody>
+      </p:sp>
+      <p:sp>
+        <p:nvSpPr>
+          <p:cNvPr id="4" name="Tijdelijke aanduiding voor dianummer 3"/>
+          <p:cNvSpPr>
+            <a:spLocks noGrp="1"/>
+          </p:cNvSpPr>
+          <p:nvPr>
+            <p:ph type="sldNum" sz="quarter" idx="5"/>
+          </p:nvPr>
+        </p:nvSpPr>
+        <p:spPr/>
+        <p:txBody>
+          <a:bodyPr/>
+          <a:lstStyle/>
+          <a:p>
+            <a:fld id="{3EBA5BD7-F043-4D1B-AA17-CD412FC534DE}" type="slidenum">
+              <a:rPr lang="nl-NL" smtClean="0"/>
+              <a:pPr/>
+              <a:t>10</a:t>
+            </a:fld>
+            <a:endParaRPr lang="nl-NL" dirty="0"/>
+          </a:p>
+        </p:txBody>
+      </p:sp>
+    </p:spTree>
+    <p:extLst>
+      <p:ext uri="{BB962C8B-B14F-4D97-AF65-F5344CB8AC3E}">
+        <p14:creationId xmlns:p14="http://schemas.microsoft.com/office/powerpoint/2010/main" val="3364451293"/>
+      </p:ext>
+    </p:extLst>
+  </p:cSld>
+  <p:clrMapOvr>
+    <a:masterClrMapping/>
+  </p:clrMapOvr>
+</p:notes>
+</file>
+
 <file path=ppt/slideLayouts/slideLayout1.xml><?xml version="1.0" encoding="utf-8"?>
 <p:sldLayout xmlns:a="http://schemas.openxmlformats.org/drawingml/2006/main" xmlns:r="http://schemas.openxmlformats.org/officeDocument/2006/relationships" xmlns:p="http://schemas.openxmlformats.org/presentationml/2006/main" type="title" preserve="1">
   <p:cSld name="Titeldia">
@@ -7290,36 +7387,149 @@
           </a:p>
         </p:txBody>
       </p:sp>
-      <p:pic>
-        <p:nvPicPr>
-          <p:cNvPr id="5" name="Afbeelding 4">
+      <p:sp>
+        <p:nvSpPr>
+          <p:cNvPr id="3" name="Tekstvak 2">
             <a:extLst>
               <a:ext uri="{FF2B5EF4-FFF2-40B4-BE49-F238E27FC236}">
-                <a16:creationId xmlns:a16="http://schemas.microsoft.com/office/drawing/2014/main" id="{E5A60807-81FF-4CB2-A66F-14E4B7CC7FB3}"/>
+                <a16:creationId xmlns:a16="http://schemas.microsoft.com/office/drawing/2014/main" id="{A5FB8517-DED9-42E6-9DD7-EF5DBA7B900F}"/>
               </a:ext>
             </a:extLst>
           </p:cNvPr>
-          <p:cNvPicPr>
-            <a:picLocks noChangeAspect="1"/>
-          </p:cNvPicPr>
+          <p:cNvSpPr txBox="1"/>
           <p:nvPr/>
-        </p:nvPicPr>
-        <p:blipFill>
-          <a:blip r:embed="rId2"/>
-          <a:stretch>
-            <a:fillRect/>
-          </a:stretch>
-        </p:blipFill>
+        </p:nvSpPr>
         <p:spPr>
           <a:xfrm>
-            <a:off x="4366220" y="55731"/>
-            <a:ext cx="7059010" cy="6677957"/>
+            <a:off x="615622" y="1628800"/>
+            <a:ext cx="10957580" cy="2677656"/>
           </a:xfrm>
           <a:prstGeom prst="rect">
             <a:avLst/>
           </a:prstGeom>
+          <a:noFill/>
         </p:spPr>
-      </p:pic>
+        <p:txBody>
+          <a:bodyPr wrap="square" rtlCol="0">
+            <a:spAutoFit/>
+          </a:bodyPr>
+          <a:lstStyle/>
+          <a:p>
+            <a:r>
+              <a:rPr lang="nl-NL" sz="2800" dirty="0" err="1"/>
+              <a:t>Program.Main</a:t>
+            </a:r>
+            <a:r>
+              <a:rPr lang="nl-NL" sz="2800" dirty="0"/>
+              <a:t>() : </a:t>
+            </a:r>
+            <a:r>
+              <a:rPr lang="nl-NL" sz="2800" dirty="0">
+                <a:hlinkClick r:id="rId3"/>
+              </a:rPr>
+              <a:t>https://puu.sh/BH7Sg.png</a:t>
+            </a:r>
+            <a:endParaRPr lang="nl-NL" sz="2800" dirty="0"/>
+          </a:p>
+          <a:p>
+            <a:r>
+              <a:rPr lang="nl-NL" sz="2800" dirty="0" err="1"/>
+              <a:t>Game.WaitForTurn</a:t>
+            </a:r>
+            <a:r>
+              <a:rPr lang="nl-NL" sz="2800" dirty="0"/>
+              <a:t>() : </a:t>
+            </a:r>
+            <a:r>
+              <a:rPr lang="nl-NL" sz="2800" dirty="0">
+                <a:hlinkClick r:id="rId4"/>
+              </a:rPr>
+              <a:t>https://puu.sh/BH7SA.png</a:t>
+            </a:r>
+            <a:endParaRPr lang="nl-NL" sz="2800" dirty="0"/>
+          </a:p>
+          <a:p>
+            <a:r>
+              <a:rPr lang="nl-NL" sz="2800" dirty="0" err="1"/>
+              <a:t>MovableObject.Move</a:t>
+            </a:r>
+            <a:r>
+              <a:rPr lang="nl-NL" sz="2800" dirty="0"/>
+              <a:t>() : </a:t>
+            </a:r>
+            <a:r>
+              <a:rPr lang="nl-NL" sz="2800" dirty="0">
+                <a:hlinkClick r:id="rId5"/>
+              </a:rPr>
+              <a:t>https://puu.sh/BH7Ts.png</a:t>
+            </a:r>
+            <a:endParaRPr lang="nl-NL" sz="2800" dirty="0"/>
+          </a:p>
+          <a:p>
+            <a:r>
+              <a:rPr lang="nl-NL" sz="2800" dirty="0" err="1"/>
+              <a:t>MovableObject</a:t>
+            </a:r>
+            <a:r>
+              <a:rPr lang="nl-NL" sz="2800" dirty="0"/>
+              <a:t> .</a:t>
+            </a:r>
+            <a:r>
+              <a:rPr lang="nl-NL" sz="2800" dirty="0" err="1"/>
+              <a:t>CanMoveTo</a:t>
+            </a:r>
+            <a:r>
+              <a:rPr lang="nl-NL" sz="2800" dirty="0"/>
+              <a:t>() : </a:t>
+            </a:r>
+            <a:r>
+              <a:rPr lang="nl-NL" sz="2800" dirty="0">
+                <a:hlinkClick r:id="rId6"/>
+              </a:rPr>
+              <a:t>https://puu.sh/BH7TR.png</a:t>
+            </a:r>
+            <a:endParaRPr lang="nl-NL" sz="2800" dirty="0"/>
+          </a:p>
+          <a:p>
+            <a:r>
+              <a:rPr lang="nl-NL" sz="2800" dirty="0" err="1"/>
+              <a:t>Trap.UsedBy</a:t>
+            </a:r>
+            <a:r>
+              <a:rPr lang="nl-NL" sz="2800" dirty="0"/>
+              <a:t>() : </a:t>
+            </a:r>
+            <a:r>
+              <a:rPr lang="nl-NL" sz="2800" dirty="0">
+                <a:hlinkClick r:id="rId7"/>
+              </a:rPr>
+              <a:t>https://puu.sh/BH7UP.png</a:t>
+            </a:r>
+            <a:r>
+              <a:rPr lang="nl-NL" sz="2800" dirty="0"/>
+              <a:t> </a:t>
+            </a:r>
+            <a:endParaRPr lang="en-US" sz="2800" dirty="0"/>
+          </a:p>
+          <a:p>
+            <a:r>
+              <a:rPr lang="nl-NL" sz="2800" dirty="0" err="1"/>
+              <a:t>Employee.Action</a:t>
+            </a:r>
+            <a:r>
+              <a:rPr lang="nl-NL" sz="2800" dirty="0"/>
+              <a:t>() : </a:t>
+            </a:r>
+            <a:r>
+              <a:rPr lang="nl-NL" sz="2800" dirty="0">
+                <a:hlinkClick r:id="rId8"/>
+              </a:rPr>
+              <a:t>https://puu.sh/BH7U0.png</a:t>
+            </a:r>
+            <a:endParaRPr lang="en-US" sz="2800" dirty="0"/>
+          </a:p>
+        </p:txBody>
+      </p:sp>
     </p:spTree>
     <p:extLst>
       <p:ext uri="{BB962C8B-B14F-4D97-AF65-F5344CB8AC3E}">
@@ -7711,6 +7921,31 @@
           </a:p>
         </p:txBody>
       </p:sp>
+      <p:sp>
+        <p:nvSpPr>
+          <p:cNvPr id="18" name="Tijdelijke aanduiding voor inhoud 17">
+            <a:extLst>
+              <a:ext uri="{FF2B5EF4-FFF2-40B4-BE49-F238E27FC236}">
+                <a16:creationId xmlns:a16="http://schemas.microsoft.com/office/drawing/2014/main" id="{8A9B2923-5F0D-42EF-BAB0-C0320B8EF597}"/>
+              </a:ext>
+            </a:extLst>
+          </p:cNvPr>
+          <p:cNvSpPr>
+            <a:spLocks noGrp="1"/>
+          </p:cNvSpPr>
+          <p:nvPr>
+            <p:ph sz="half" idx="1"/>
+          </p:nvPr>
+        </p:nvSpPr>
+        <p:spPr/>
+        <p:txBody>
+          <a:bodyPr/>
+          <a:lstStyle/>
+          <a:p>
+            <a:endParaRPr lang="nl-NL"/>
+          </a:p>
+        </p:txBody>
+      </p:sp>
       <p:pic>
         <p:nvPicPr>
           <p:cNvPr id="3" name="Afbeelding 2">
@@ -7830,7 +8065,7 @@
         </p:blipFill>
         <p:spPr>
           <a:xfrm>
-            <a:off x="3646140" y="1844824"/>
+            <a:off x="1218883" y="2060848"/>
             <a:ext cx="3744416" cy="4032452"/>
           </a:xfrm>
           <a:prstGeom prst="rect">

</xml_diff>